<commit_message>
fixed marks, still need Test generation ttime
</commit_message>
<xml_diff>
--- a/Presentation/Pronin LandscapeGen.pptx
+++ b/Presentation/Pronin LandscapeGen.pptx
@@ -207,7 +207,7 @@
           <a:p>
             <a:fld id="{1BC5A0F5-D0D3-499B-812F-0FEE7EBF608C}" type="datetimeFigureOut">
               <a:rPr lang="ru-RU" smtClean="0"/>
-              <a:t>17.12.2021</a:t>
+              <a:t>19.12.2021</a:t>
             </a:fld>
             <a:endParaRPr lang="ru-RU"/>
           </a:p>
@@ -705,7 +705,7 @@
           <a:p>
             <a:fld id="{F43D72E7-29F7-4AAA-9BD1-B4061380111F}" type="datetimeFigureOut">
               <a:rPr lang="ru-RU" smtClean="0"/>
-              <a:t>17.12.2021</a:t>
+              <a:t>19.12.2021</a:t>
             </a:fld>
             <a:endParaRPr lang="ru-RU"/>
           </a:p>
@@ -903,7 +903,7 @@
           <a:p>
             <a:fld id="{F43D72E7-29F7-4AAA-9BD1-B4061380111F}" type="datetimeFigureOut">
               <a:rPr lang="ru-RU" smtClean="0"/>
-              <a:t>17.12.2021</a:t>
+              <a:t>19.12.2021</a:t>
             </a:fld>
             <a:endParaRPr lang="ru-RU"/>
           </a:p>
@@ -1111,7 +1111,7 @@
           <a:p>
             <a:fld id="{F43D72E7-29F7-4AAA-9BD1-B4061380111F}" type="datetimeFigureOut">
               <a:rPr lang="ru-RU" smtClean="0"/>
-              <a:t>17.12.2021</a:t>
+              <a:t>19.12.2021</a:t>
             </a:fld>
             <a:endParaRPr lang="ru-RU"/>
           </a:p>
@@ -1309,7 +1309,7 @@
           <a:p>
             <a:fld id="{F43D72E7-29F7-4AAA-9BD1-B4061380111F}" type="datetimeFigureOut">
               <a:rPr lang="ru-RU" smtClean="0"/>
-              <a:t>17.12.2021</a:t>
+              <a:t>19.12.2021</a:t>
             </a:fld>
             <a:endParaRPr lang="ru-RU"/>
           </a:p>
@@ -1584,7 +1584,7 @@
           <a:p>
             <a:fld id="{F43D72E7-29F7-4AAA-9BD1-B4061380111F}" type="datetimeFigureOut">
               <a:rPr lang="ru-RU" smtClean="0"/>
-              <a:t>17.12.2021</a:t>
+              <a:t>19.12.2021</a:t>
             </a:fld>
             <a:endParaRPr lang="ru-RU"/>
           </a:p>
@@ -1849,7 +1849,7 @@
           <a:p>
             <a:fld id="{F43D72E7-29F7-4AAA-9BD1-B4061380111F}" type="datetimeFigureOut">
               <a:rPr lang="ru-RU" smtClean="0"/>
-              <a:t>17.12.2021</a:t>
+              <a:t>19.12.2021</a:t>
             </a:fld>
             <a:endParaRPr lang="ru-RU"/>
           </a:p>
@@ -2261,7 +2261,7 @@
           <a:p>
             <a:fld id="{F43D72E7-29F7-4AAA-9BD1-B4061380111F}" type="datetimeFigureOut">
               <a:rPr lang="ru-RU" smtClean="0"/>
-              <a:t>17.12.2021</a:t>
+              <a:t>19.12.2021</a:t>
             </a:fld>
             <a:endParaRPr lang="ru-RU"/>
           </a:p>
@@ -2402,7 +2402,7 @@
           <a:p>
             <a:fld id="{F43D72E7-29F7-4AAA-9BD1-B4061380111F}" type="datetimeFigureOut">
               <a:rPr lang="ru-RU" smtClean="0"/>
-              <a:t>17.12.2021</a:t>
+              <a:t>19.12.2021</a:t>
             </a:fld>
             <a:endParaRPr lang="ru-RU"/>
           </a:p>
@@ -2515,7 +2515,7 @@
           <a:p>
             <a:fld id="{F43D72E7-29F7-4AAA-9BD1-B4061380111F}" type="datetimeFigureOut">
               <a:rPr lang="ru-RU" smtClean="0"/>
-              <a:t>17.12.2021</a:t>
+              <a:t>19.12.2021</a:t>
             </a:fld>
             <a:endParaRPr lang="ru-RU"/>
           </a:p>
@@ -2826,7 +2826,7 @@
           <a:p>
             <a:fld id="{F43D72E7-29F7-4AAA-9BD1-B4061380111F}" type="datetimeFigureOut">
               <a:rPr lang="ru-RU" smtClean="0"/>
-              <a:t>17.12.2021</a:t>
+              <a:t>19.12.2021</a:t>
             </a:fld>
             <a:endParaRPr lang="ru-RU"/>
           </a:p>
@@ -3114,7 +3114,7 @@
           <a:p>
             <a:fld id="{F43D72E7-29F7-4AAA-9BD1-B4061380111F}" type="datetimeFigureOut">
               <a:rPr lang="ru-RU" smtClean="0"/>
-              <a:t>17.12.2021</a:t>
+              <a:t>19.12.2021</a:t>
             </a:fld>
             <a:endParaRPr lang="ru-RU"/>
           </a:p>
@@ -3355,7 +3355,7 @@
           <a:p>
             <a:fld id="{F43D72E7-29F7-4AAA-9BD1-B4061380111F}" type="datetimeFigureOut">
               <a:rPr lang="ru-RU" smtClean="0"/>
-              <a:t>17.12.2021</a:t>
+              <a:t>19.12.2021</a:t>
             </a:fld>
             <a:endParaRPr lang="ru-RU"/>
           </a:p>
@@ -4276,7 +4276,7 @@
               <a:buNone/>
             </a:pPr>
             <a:r>
-              <a:rPr lang="ru-RU" sz="2400" dirty="0"/>
+              <a:rPr lang="ru-RU" sz="2000" dirty="0"/>
               <a:t>По итогу проделанной работы была достигнута цель – разработана программа генерации и визуализации трехмерного изображения </a:t>
             </a:r>
           </a:p>
@@ -4285,71 +4285,86 @@
               <a:buNone/>
             </a:pPr>
             <a:r>
-              <a:rPr lang="ru-RU" sz="2400" dirty="0"/>
+              <a:rPr lang="ru-RU" sz="2000" dirty="0"/>
               <a:t>Также были решены все поставленные задачи, а именно:</a:t>
             </a:r>
           </a:p>
           <a:p>
             <a:pPr lvl="0"/>
             <a:r>
-              <a:rPr lang="ru-RU" sz="2400" dirty="0"/>
+              <a:rPr lang="ru-RU" sz="2000" dirty="0"/>
               <a:t>проанализированы представления данных о ландшафте;</a:t>
             </a:r>
           </a:p>
           <a:p>
             <a:pPr lvl="0"/>
             <a:r>
-              <a:rPr lang="ru-RU" sz="2400" dirty="0"/>
+              <a:rPr lang="ru-RU" sz="2000" dirty="0"/>
               <a:t>проанализированы алгоритмы генерации ландшафта</a:t>
             </a:r>
             <a:r>
-              <a:rPr lang="en-US" sz="2400" dirty="0"/>
+              <a:rPr lang="en-US" sz="2000" dirty="0"/>
               <a:t>;</a:t>
             </a:r>
+            <a:endParaRPr lang="ru-RU" sz="2000" dirty="0"/>
+          </a:p>
+          <a:p>
+            <a:pPr lvl="0"/>
+            <a:r>
+              <a:rPr lang="ru-RU" sz="2000" dirty="0"/>
+              <a:t>проанализированы алгоритмы удаления невидимых поверхностей;</a:t>
+            </a:r>
+          </a:p>
+          <a:p>
+            <a:pPr lvl="0"/>
+            <a:r>
+              <a:rPr lang="ru-RU" sz="2000" dirty="0"/>
+              <a:t>выбраны необходимые структуры данных для изображения ландшафта;</a:t>
+            </a:r>
+          </a:p>
+          <a:p>
+            <a:pPr lvl="0"/>
+            <a:r>
+              <a:rPr lang="ru-RU" sz="2000" dirty="0"/>
+              <a:t>выбраны основные инструменты для разработки программы;</a:t>
+            </a:r>
+          </a:p>
+          <a:p>
+            <a:pPr lvl="0"/>
+            <a:r>
+              <a:rPr lang="ru-RU" sz="2000" dirty="0"/>
+              <a:t>разработана программа, реализующая поставленную задачу; </a:t>
+            </a:r>
+          </a:p>
+          <a:p>
+            <a:pPr lvl="0"/>
+            <a:r>
+              <a:rPr lang="ru-RU" sz="2000" dirty="0"/>
+              <a:t>проведён сравнительный анализ времени выполнения алгоритма </a:t>
+            </a:r>
+            <a:r>
+              <a:rPr lang="en-US" sz="2000" dirty="0" err="1"/>
+              <a:t>ZBuffer</a:t>
+            </a:r>
+            <a:r>
+              <a:rPr lang="en-US" sz="2000" dirty="0"/>
+              <a:t> </a:t>
+            </a:r>
+            <a:r>
+              <a:rPr lang="ru-RU" sz="2000" dirty="0"/>
+              <a:t>с использованием параллельных вычислений и без;</a:t>
+            </a:r>
+          </a:p>
+          <a:p>
+            <a:r>
+              <a:rPr lang="ru-RU" sz="2000" dirty="0"/>
+              <a:t>произведена оценка времени генерации ландшафта в зависимости от размера.</a:t>
+            </a:r>
             <a:endParaRPr lang="ru-RU" sz="2400" dirty="0"/>
           </a:p>
           <a:p>
             <a:pPr lvl="0"/>
-            <a:r>
-              <a:rPr lang="ru-RU" sz="2400" dirty="0"/>
-              <a:t>проанализированы алгоритмы удаления невидимых поверхностей;</a:t>
-            </a:r>
-          </a:p>
-          <a:p>
-            <a:pPr lvl="0"/>
-            <a:r>
-              <a:rPr lang="ru-RU" sz="2400" dirty="0"/>
-              <a:t>выбраны необходимые структуры данных для изображения ландшафта;</a:t>
-            </a:r>
-          </a:p>
-          <a:p>
-            <a:pPr lvl="0"/>
-            <a:r>
-              <a:rPr lang="ru-RU" sz="2400" dirty="0"/>
-              <a:t>выбраны основные инструменты для разработки программы;</a:t>
-            </a:r>
-          </a:p>
-          <a:p>
-            <a:pPr lvl="0"/>
-            <a:r>
-              <a:rPr lang="ru-RU" sz="2400" dirty="0"/>
-              <a:t>разработана программа, реализующая поставленную задачу; </a:t>
-            </a:r>
-          </a:p>
-          <a:p>
-            <a:pPr lvl="0"/>
-            <a:r>
-              <a:rPr lang="ru-RU" sz="2400" dirty="0"/>
-              <a:t>проведён сравнительный анализ времени выполнения алгоритма </a:t>
-            </a:r>
-            <a:r>
-              <a:rPr lang="en-US" sz="2400" dirty="0"/>
-              <a:t>ZBuffer </a:t>
-            </a:r>
-            <a:r>
-              <a:rPr lang="ru-RU" sz="2400" dirty="0"/>
-              <a:t>с использованием параллельных вычислений и без.</a:t>
-            </a:r>
+            <a:endParaRPr lang="ru-RU" sz="2400" dirty="0"/>
           </a:p>
           <a:p>
             <a:endParaRPr lang="ru-RU" sz="2400" dirty="0"/>
@@ -4438,7 +4453,7 @@
         </p:spPr>
         <p:txBody>
           <a:bodyPr>
-            <a:normAutofit fontScale="92500" lnSpcReduction="20000"/>
+            <a:normAutofit fontScale="85000" lnSpcReduction="20000"/>
           </a:bodyPr>
           <a:lstStyle/>
           <a:p>
@@ -4516,13 +4531,26 @@
               <a:t>провести сравнительный анализ времени выполнения алгоритма </a:t>
             </a:r>
             <a:r>
+              <a:rPr lang="en-US" dirty="0" err="1"/>
+              <a:t>ZBuffer</a:t>
+            </a:r>
+            <a:r>
               <a:rPr lang="en-US" dirty="0"/>
-              <a:t>ZBuffer </a:t>
+              <a:t> </a:t>
             </a:r>
             <a:r>
               <a:rPr lang="ru-RU" dirty="0"/>
-              <a:t>с использованием параллельных вычислений и без.</a:t>
-            </a:r>
+              <a:t>с использованием параллельных вычислений и без;</a:t>
+            </a:r>
+          </a:p>
+          <a:p>
+            <a:r>
+              <a:rPr lang="ru-RU" dirty="0"/>
+              <a:t>произвести оценку времени генерации ландшафта в зависимости от размера.</a:t>
+            </a:r>
+          </a:p>
+          <a:p>
+            <a:endParaRPr lang="ru-RU" dirty="0"/>
           </a:p>
         </p:txBody>
       </p:sp>

</xml_diff>

<commit_message>
Done Time tests and fixing report and Presentation
</commit_message>
<xml_diff>
--- a/Presentation/Pronin LandscapeGen.pptx
+++ b/Presentation/Pronin LandscapeGen.pptx
@@ -5,7 +5,7 @@
     <p:sldMasterId id="2147483648" r:id="rId1"/>
   </p:sldMasterIdLst>
   <p:notesMasterIdLst>
-    <p:notesMasterId r:id="rId13"/>
+    <p:notesMasterId r:id="rId14"/>
   </p:notesMasterIdLst>
   <p:sldIdLst>
     <p:sldId id="256" r:id="rId2"/>
@@ -18,7 +18,8 @@
     <p:sldId id="263" r:id="rId9"/>
     <p:sldId id="264" r:id="rId10"/>
     <p:sldId id="265" r:id="rId11"/>
-    <p:sldId id="266" r:id="rId12"/>
+    <p:sldId id="267" r:id="rId12"/>
+    <p:sldId id="266" r:id="rId13"/>
   </p:sldIdLst>
   <p:sldSz cx="12192000" cy="6858000"/>
   <p:notesSz cx="6858000" cy="9144000"/>
@@ -539,7 +540,7 @@
           <a:p>
             <a:fld id="{4BFF52A9-5122-4760-8E24-BCA384AEE220}" type="slidenum">
               <a:rPr lang="ru-RU" smtClean="0"/>
-              <a:t>11</a:t>
+              <a:t>12</a:t>
             </a:fld>
             <a:endParaRPr lang="ru-RU"/>
           </a:p>
@@ -4121,7 +4122,7 @@
             </a:r>
             <a:r>
               <a:rPr lang="ru-RU" b="1" dirty="0"/>
-              <a:t>с использованием параллельных вычислений и без.</a:t>
+              <a:t>с использованием параллельных вычислений и без</a:t>
             </a:r>
           </a:p>
         </p:txBody>
@@ -4221,6 +4222,112 @@
           <p:cNvPr id="2" name="Заголовок 1">
             <a:extLst>
               <a:ext uri="{FF2B5EF4-FFF2-40B4-BE49-F238E27FC236}">
+                <a16:creationId xmlns:a16="http://schemas.microsoft.com/office/drawing/2014/main" id="{63BD9DD9-1420-48A4-BA7B-9237EF074807}"/>
+              </a:ext>
+            </a:extLst>
+          </p:cNvPr>
+          <p:cNvSpPr>
+            <a:spLocks noGrp="1"/>
+          </p:cNvSpPr>
+          <p:nvPr>
+            <p:ph type="title"/>
+          </p:nvPr>
+        </p:nvSpPr>
+        <p:spPr/>
+        <p:txBody>
+          <a:bodyPr/>
+          <a:lstStyle/>
+          <a:p>
+            <a:r>
+              <a:rPr lang="ru-RU" b="1" dirty="0"/>
+              <a:t>Оценка времени выполнения алгоритма </a:t>
+            </a:r>
+            <a:r>
+              <a:rPr lang="en-US" b="1" dirty="0"/>
+              <a:t>diamond</a:t>
+            </a:r>
+            <a:r>
+              <a:rPr lang="ru-RU" b="1" dirty="0"/>
+              <a:t>-</a:t>
+            </a:r>
+            <a:r>
+              <a:rPr lang="en-US" b="1" dirty="0"/>
+              <a:t>square</a:t>
+            </a:r>
+            <a:r>
+              <a:rPr lang="ru-RU" b="1" dirty="0"/>
+              <a:t> в зависимости от размера</a:t>
+            </a:r>
+          </a:p>
+        </p:txBody>
+      </p:sp>
+      <p:pic>
+        <p:nvPicPr>
+          <p:cNvPr id="4" name="Объект 3">
+            <a:extLst>
+              <a:ext uri="{FF2B5EF4-FFF2-40B4-BE49-F238E27FC236}">
+                <a16:creationId xmlns:a16="http://schemas.microsoft.com/office/drawing/2014/main" id="{5A8A4145-CEC9-4818-A64D-E2F85439F363}"/>
+              </a:ext>
+            </a:extLst>
+          </p:cNvPr>
+          <p:cNvPicPr>
+            <a:picLocks noGrp="1" noChangeAspect="1"/>
+          </p:cNvPicPr>
+          <p:nvPr>
+            <p:ph idx="1"/>
+          </p:nvPr>
+        </p:nvPicPr>
+        <p:blipFill>
+          <a:blip r:embed="rId2"/>
+          <a:stretch>
+            <a:fillRect/>
+          </a:stretch>
+        </p:blipFill>
+        <p:spPr>
+          <a:xfrm>
+            <a:off x="1556867" y="2223348"/>
+            <a:ext cx="9078265" cy="3698058"/>
+          </a:xfrm>
+          <a:prstGeom prst="rect">
+            <a:avLst/>
+          </a:prstGeom>
+        </p:spPr>
+      </p:pic>
+    </p:spTree>
+    <p:extLst>
+      <p:ext uri="{BB962C8B-B14F-4D97-AF65-F5344CB8AC3E}">
+        <p14:creationId xmlns:p14="http://schemas.microsoft.com/office/powerpoint/2010/main" val="208590477"/>
+      </p:ext>
+    </p:extLst>
+  </p:cSld>
+  <p:clrMapOvr>
+    <a:masterClrMapping/>
+  </p:clrMapOvr>
+</p:sld>
+</file>
+
+<file path=ppt/slides/slide12.xml><?xml version="1.0" encoding="utf-8"?>
+<p:sld xmlns:a="http://schemas.openxmlformats.org/drawingml/2006/main" xmlns:r="http://schemas.openxmlformats.org/officeDocument/2006/relationships" xmlns:p="http://schemas.openxmlformats.org/presentationml/2006/main">
+  <p:cSld>
+    <p:spTree>
+      <p:nvGrpSpPr>
+        <p:cNvPr id="1" name=""/>
+        <p:cNvGrpSpPr/>
+        <p:nvPr/>
+      </p:nvGrpSpPr>
+      <p:grpSpPr>
+        <a:xfrm>
+          <a:off x="0" y="0"/>
+          <a:ext cx="0" cy="0"/>
+          <a:chOff x="0" y="0"/>
+          <a:chExt cx="0" cy="0"/>
+        </a:xfrm>
+      </p:grpSpPr>
+      <p:sp>
+        <p:nvSpPr>
+          <p:cNvPr id="2" name="Заголовок 1">
+            <a:extLst>
+              <a:ext uri="{FF2B5EF4-FFF2-40B4-BE49-F238E27FC236}">
                 <a16:creationId xmlns:a16="http://schemas.microsoft.com/office/drawing/2014/main" id="{996F629C-A1CC-408F-A72C-639ECC6D8F20}"/>
               </a:ext>
             </a:extLst>
@@ -4246,10 +4353,10 @@
       </p:sp>
       <p:sp>
         <p:nvSpPr>
-          <p:cNvPr id="3" name="Объект 2">
-            <a:extLst>
-              <a:ext uri="{FF2B5EF4-FFF2-40B4-BE49-F238E27FC236}">
-                <a16:creationId xmlns:a16="http://schemas.microsoft.com/office/drawing/2014/main" id="{E26AA284-BFE1-4139-8D0B-F530B1F34E4D}"/>
+          <p:cNvPr id="5" name="Объект 4">
+            <a:extLst>
+              <a:ext uri="{FF2B5EF4-FFF2-40B4-BE49-F238E27FC236}">
+                <a16:creationId xmlns:a16="http://schemas.microsoft.com/office/drawing/2014/main" id="{99CCA9AC-03F9-4BBF-A1B1-113452ADAD05}"/>
               </a:ext>
             </a:extLst>
           </p:cNvPr>
@@ -4262,13 +4369,13 @@
         </p:nvSpPr>
         <p:spPr>
           <a:xfrm>
-            <a:off x="838200" y="1438183"/>
-            <a:ext cx="10515600" cy="5054692"/>
+            <a:off x="838200" y="1825625"/>
+            <a:ext cx="10515600" cy="4351338"/>
           </a:xfrm>
         </p:spPr>
         <p:txBody>
           <a:bodyPr>
-            <a:noAutofit/>
+            <a:normAutofit fontScale="77500" lnSpcReduction="20000"/>
           </a:bodyPr>
           <a:lstStyle/>
           <a:p>
@@ -4276,8 +4383,8 @@
               <a:buNone/>
             </a:pPr>
             <a:r>
-              <a:rPr lang="ru-RU" sz="2000" dirty="0"/>
-              <a:t>По итогу проделанной работы была достигнута цель – разработана программа генерации и визуализации трехмерного изображения </a:t>
+              <a:rPr lang="ru-RU" dirty="0"/>
+              <a:t>По итогу проделанной работы была достигнута цель – разработана программа генерации и визуализации трехмерного изображения.</a:t>
             </a:r>
           </a:p>
           <a:p>
@@ -4285,89 +4392,101 @@
               <a:buNone/>
             </a:pPr>
             <a:r>
-              <a:rPr lang="ru-RU" sz="2000" dirty="0"/>
+              <a:rPr lang="ru-RU" dirty="0"/>
               <a:t>Также были решены все поставленные задачи, а именно:</a:t>
             </a:r>
           </a:p>
           <a:p>
             <a:pPr lvl="0"/>
             <a:r>
-              <a:rPr lang="ru-RU" sz="2000" dirty="0"/>
+              <a:rPr lang="ru-RU" dirty="0"/>
               <a:t>проанализированы представления данных о ландшафте;</a:t>
             </a:r>
           </a:p>
           <a:p>
             <a:pPr lvl="0"/>
             <a:r>
-              <a:rPr lang="ru-RU" sz="2000" dirty="0"/>
+              <a:rPr lang="ru-RU" dirty="0"/>
               <a:t>проанализированы алгоритмы генерации ландшафта</a:t>
             </a:r>
             <a:r>
-              <a:rPr lang="en-US" sz="2000" dirty="0"/>
+              <a:rPr lang="en-US" dirty="0"/>
               <a:t>;</a:t>
             </a:r>
-            <a:endParaRPr lang="ru-RU" sz="2000" dirty="0"/>
+            <a:endParaRPr lang="ru-RU" dirty="0"/>
           </a:p>
           <a:p>
             <a:pPr lvl="0"/>
             <a:r>
-              <a:rPr lang="ru-RU" sz="2000" dirty="0"/>
+              <a:rPr lang="ru-RU" dirty="0"/>
               <a:t>проанализированы алгоритмы удаления невидимых поверхностей;</a:t>
             </a:r>
           </a:p>
           <a:p>
             <a:pPr lvl="0"/>
             <a:r>
-              <a:rPr lang="ru-RU" sz="2000" dirty="0"/>
+              <a:rPr lang="ru-RU" dirty="0"/>
               <a:t>выбраны необходимые структуры данных для изображения ландшафта;</a:t>
             </a:r>
           </a:p>
           <a:p>
             <a:pPr lvl="0"/>
             <a:r>
-              <a:rPr lang="ru-RU" sz="2000" dirty="0"/>
+              <a:rPr lang="ru-RU" dirty="0"/>
               <a:t>выбраны основные инструменты для разработки программы;</a:t>
             </a:r>
           </a:p>
           <a:p>
             <a:pPr lvl="0"/>
             <a:r>
-              <a:rPr lang="ru-RU" sz="2000" dirty="0"/>
+              <a:rPr lang="ru-RU" dirty="0"/>
               <a:t>разработана программа, реализующая поставленную задачу; </a:t>
             </a:r>
           </a:p>
           <a:p>
             <a:pPr lvl="0"/>
             <a:r>
-              <a:rPr lang="ru-RU" sz="2000" dirty="0"/>
+              <a:rPr lang="ru-RU" dirty="0"/>
               <a:t>проведён сравнительный анализ времени выполнения алгоритма </a:t>
             </a:r>
             <a:r>
-              <a:rPr lang="en-US" sz="2000" dirty="0" err="1"/>
+              <a:rPr lang="en-US" dirty="0" err="1"/>
               <a:t>ZBuffer</a:t>
             </a:r>
             <a:r>
-              <a:rPr lang="en-US" sz="2000" dirty="0"/>
+              <a:rPr lang="en-US" dirty="0"/>
               <a:t> </a:t>
             </a:r>
             <a:r>
-              <a:rPr lang="ru-RU" sz="2000" dirty="0"/>
+              <a:rPr lang="ru-RU" dirty="0"/>
               <a:t>с использованием параллельных вычислений и без;</a:t>
             </a:r>
           </a:p>
           <a:p>
-            <a:r>
-              <a:rPr lang="ru-RU" sz="2000" dirty="0"/>
-              <a:t>произведена оценка времени генерации ландшафта в зависимости от размера.</a:t>
-            </a:r>
-            <a:endParaRPr lang="ru-RU" sz="2400" dirty="0"/>
-          </a:p>
-          <a:p>
             <a:pPr lvl="0"/>
-            <a:endParaRPr lang="ru-RU" sz="2400" dirty="0"/>
-          </a:p>
-          <a:p>
-            <a:endParaRPr lang="ru-RU" sz="2400" dirty="0"/>
+            <a:r>
+              <a:rPr lang="ru-RU" dirty="0"/>
+              <a:t>произведена оценка времени выполнения алгоритма </a:t>
+            </a:r>
+            <a:r>
+              <a:rPr lang="en-US" dirty="0"/>
+              <a:t>diamond</a:t>
+            </a:r>
+            <a:r>
+              <a:rPr lang="ru-RU" dirty="0"/>
+              <a:t>-</a:t>
+            </a:r>
+            <a:r>
+              <a:rPr lang="en-US" dirty="0"/>
+              <a:t>square </a:t>
+            </a:r>
+            <a:r>
+              <a:rPr lang="ru-RU" dirty="0"/>
+              <a:t>в зависимости от размера карты высот.</a:t>
+            </a:r>
+          </a:p>
+          <a:p>
+            <a:endParaRPr lang="ru-RU" dirty="0"/>
           </a:p>
         </p:txBody>
       </p:sp>
@@ -4546,7 +4665,23 @@
           <a:p>
             <a:r>
               <a:rPr lang="ru-RU" dirty="0"/>
-              <a:t>произвести оценку времени генерации ландшафта в зависимости от размера.</a:t>
+              <a:t>оценить время выполнения алгоритма </a:t>
+            </a:r>
+            <a:r>
+              <a:rPr lang="en-US" dirty="0"/>
+              <a:t>diamond</a:t>
+            </a:r>
+            <a:r>
+              <a:rPr lang="ru-RU" dirty="0"/>
+              <a:t>-</a:t>
+            </a:r>
+            <a:r>
+              <a:rPr lang="en-US" dirty="0"/>
+              <a:t>square </a:t>
+            </a:r>
+            <a:r>
+              <a:rPr lang="ru-RU" dirty="0"/>
+              <a:t>в зависимости от размера карты высот.</a:t>
             </a:r>
           </a:p>
           <a:p>

</xml_diff>